<commit_message>
Updated Powerpoint finns det mer
</commit_message>
<xml_diff>
--- a/doc/Scala intermediate.pptx
+++ b/doc/Scala intermediate.pptx
@@ -34177,42 +34177,69 @@
           <a:p>
             <a:pPr eaLnBrk="1" hangingPunct="1"/>
             <a:r>
+              <a:rPr lang="sv-SE" dirty="0" err="1"/>
+              <a:t>pattern</a:t>
+            </a:r>
+            <a:r>
+              <a:rPr lang="sv-SE" dirty="0"/>
+              <a:t> </a:t>
+            </a:r>
+            <a:r>
+              <a:rPr lang="sv-SE" dirty="0" err="1"/>
+              <a:t>matching</a:t>
+            </a:r>
+            <a:r>
+              <a:rPr lang="sv-SE" dirty="0"/>
+              <a:t>, dyka djupare</a:t>
+            </a:r>
+          </a:p>
+          <a:p>
+            <a:pPr eaLnBrk="1" hangingPunct="1"/>
+            <a:r>
+              <a:rPr lang="sv-SE" dirty="0" err="1"/>
+              <a:t>actors</a:t>
+            </a:r>
+            <a:r>
+              <a:rPr lang="sv-SE" dirty="0"/>
+              <a:t> och Akka, dyka djupare och </a:t>
+            </a:r>
+            <a:r>
+              <a:rPr lang="sv-SE" dirty="0" smtClean="0"/>
+              <a:t>övning/demo</a:t>
+            </a:r>
+          </a:p>
+          <a:p>
+            <a:pPr eaLnBrk="1" hangingPunct="1"/>
+            <a:endParaRPr lang="sv-SE" dirty="0"/>
+          </a:p>
+          <a:p>
+            <a:pPr eaLnBrk="1" hangingPunct="1"/>
+            <a:r>
               <a:rPr lang="sv-SE" dirty="0" err="1" smtClean="0"/>
               <a:t>collections</a:t>
             </a:r>
             <a:r>
               <a:rPr lang="sv-SE" dirty="0" smtClean="0"/>
-              <a:t> och combinators</a:t>
+              <a:t> </a:t>
+            </a:r>
+            <a:r>
+              <a:rPr lang="sv-SE" dirty="0" smtClean="0"/>
+              <a:t>och combinators</a:t>
             </a:r>
           </a:p>
           <a:p>
             <a:pPr eaLnBrk="1" hangingPunct="1"/>
             <a:r>
               <a:rPr lang="sv-SE" dirty="0" err="1" smtClean="0"/>
-              <a:t>pattern</a:t>
+              <a:t>futures</a:t>
             </a:r>
             <a:r>
               <a:rPr lang="sv-SE" dirty="0" smtClean="0"/>
               <a:t> </a:t>
             </a:r>
             <a:r>
-              <a:rPr lang="sv-SE" dirty="0" err="1" smtClean="0"/>
-              <a:t>matching</a:t>
-            </a:r>
-            <a:r>
               <a:rPr lang="sv-SE" dirty="0" smtClean="0"/>
-              <a:t>, dyka djupare</a:t>
-            </a:r>
-          </a:p>
-          <a:p>
-            <a:pPr eaLnBrk="1" hangingPunct="1"/>
-            <a:r>
-              <a:rPr lang="sv-SE" dirty="0" err="1" smtClean="0"/>
-              <a:t>futures</a:t>
-            </a:r>
-            <a:r>
-              <a:rPr lang="sv-SE" dirty="0" smtClean="0"/>
-              <a:t> och </a:t>
+              <a:t>och </a:t>
             </a:r>
             <a:r>
               <a:rPr lang="sv-SE" dirty="0" err="1" smtClean="0"/>
@@ -34223,19 +34250,12 @@
           <a:p>
             <a:pPr eaLnBrk="1" hangingPunct="1"/>
             <a:r>
-              <a:rPr lang="sv-SE" dirty="0" err="1" smtClean="0"/>
-              <a:t>actors</a:t>
-            </a:r>
-            <a:r>
               <a:rPr lang="sv-SE" dirty="0" smtClean="0"/>
-              <a:t> och Akka, dyka djupare och demo</a:t>
-            </a:r>
-          </a:p>
-          <a:p>
-            <a:pPr eaLnBrk="1" hangingPunct="1"/>
+              <a:t>Scala </a:t>
+            </a:r>
             <a:r>
               <a:rPr lang="sv-SE" dirty="0" smtClean="0"/>
-              <a:t>Scala testning, titta på </a:t>
+              <a:t>testning, titta på </a:t>
             </a:r>
             <a:r>
               <a:rPr lang="sv-SE" dirty="0" err="1" smtClean="0"/>
@@ -34254,30 +34274,11 @@
             <a:pPr eaLnBrk="1" hangingPunct="1"/>
             <a:r>
               <a:rPr lang="sv-SE" dirty="0" smtClean="0"/>
-              <a:t>Simple </a:t>
-            </a:r>
-            <a:r>
-              <a:rPr lang="sv-SE" dirty="0" err="1" smtClean="0"/>
-              <a:t>Build</a:t>
+              <a:t>Style </a:t>
             </a:r>
             <a:r>
               <a:rPr lang="sv-SE" dirty="0" smtClean="0"/>
-              <a:t> </a:t>
-            </a:r>
-            <a:r>
-              <a:rPr lang="sv-SE" dirty="0" err="1" smtClean="0"/>
-              <a:t>Tool</a:t>
-            </a:r>
-            <a:r>
-              <a:rPr lang="sv-SE" dirty="0" smtClean="0"/>
-              <a:t>, SBT</a:t>
-            </a:r>
-          </a:p>
-          <a:p>
-            <a:pPr eaLnBrk="1" hangingPunct="1"/>
-            <a:r>
-              <a:rPr lang="sv-SE" dirty="0" smtClean="0"/>
-              <a:t>Style och praktiskt Scala</a:t>
+              <a:t>och praktiskt Scala</a:t>
             </a:r>
           </a:p>
           <a:p>
@@ -34288,8 +34289,9 @@
             <a:pPr eaLnBrk="1" hangingPunct="1"/>
             <a:r>
               <a:rPr lang="sv-SE" dirty="0" smtClean="0"/>
-              <a:t>annat…</a:t>
-            </a:r>
+              <a:t>Annat om tid finns</a:t>
+            </a:r>
+            <a:endParaRPr lang="sv-SE" dirty="0" smtClean="0"/>
           </a:p>
         </p:txBody>
       </p:sp>

</xml_diff>

<commit_message>
Updated Powerpoint terminate sequence
</commit_message>
<xml_diff>
--- a/doc/Scala intermediate.pptx
+++ b/doc/Scala intermediate.pptx
@@ -27710,34 +27710,7 @@
                                           </p:stCondLst>
                                         </p:cTn>
                                         <p:tgtEl>
-                                          <p:spTgt spid="27"/>
-                                        </p:tgtEl>
-                                        <p:attrNameLst>
-                                          <p:attrName>style.visibility</p:attrName>
-                                        </p:attrNameLst>
-                                      </p:cBhvr>
-                                      <p:to>
-                                        <p:strVal val="visible"/>
-                                      </p:to>
-                                    </p:set>
-                                  </p:childTnLst>
-                                </p:cTn>
-                              </p:par>
-                              <p:par>
-                                <p:cTn id="63" presetID="1" presetClass="entr" presetSubtype="0" fill="hold" nodeType="withEffect">
-                                  <p:stCondLst>
-                                    <p:cond delay="0"/>
-                                  </p:stCondLst>
-                                  <p:childTnLst>
-                                    <p:set>
-                                      <p:cBhvr>
-                                        <p:cTn id="64" dur="1" fill="hold">
-                                          <p:stCondLst>
-                                            <p:cond delay="0"/>
-                                          </p:stCondLst>
-                                        </p:cTn>
-                                        <p:tgtEl>
-                                          <p:spTgt spid="30"/>
+                                          <p:spTgt spid="33"/>
                                         </p:tgtEl>
                                         <p:attrNameLst>
                                           <p:attrName>style.visibility</p:attrName>
@@ -27757,19 +27730,46 @@
                     </p:cTn>
                   </p:par>
                   <p:par>
-                    <p:cTn id="65" fill="hold">
+                    <p:cTn id="63" fill="hold">
                       <p:stCondLst>
                         <p:cond delay="indefinite"/>
                       </p:stCondLst>
                       <p:childTnLst>
                         <p:par>
-                          <p:cTn id="66" fill="hold">
+                          <p:cTn id="64" fill="hold">
                             <p:stCondLst>
                               <p:cond delay="0"/>
                             </p:stCondLst>
                             <p:childTnLst>
                               <p:par>
-                                <p:cTn id="67" presetID="1" presetClass="entr" presetSubtype="0" fill="hold" nodeType="clickEffect">
+                                <p:cTn id="65" presetID="1" presetClass="entr" presetSubtype="0" fill="hold" nodeType="clickEffect">
+                                  <p:stCondLst>
+                                    <p:cond delay="0"/>
+                                  </p:stCondLst>
+                                  <p:childTnLst>
+                                    <p:set>
+                                      <p:cBhvr>
+                                        <p:cTn id="66" dur="1" fill="hold">
+                                          <p:stCondLst>
+                                            <p:cond delay="0"/>
+                                          </p:stCondLst>
+                                        </p:cTn>
+                                        <p:tgtEl>
+                                          <p:spTgt spid="27"/>
+                                        </p:tgtEl>
+                                        <p:attrNameLst>
+                                          <p:attrName>style.visibility</p:attrName>
+                                        </p:attrNameLst>
+                                      </p:cBhvr>
+                                      <p:to>
+                                        <p:strVal val="visible"/>
+                                      </p:to>
+                                    </p:set>
+                                  </p:childTnLst>
+                                </p:cTn>
+                              </p:par>
+                              <p:par>
+                                <p:cTn id="67" presetID="1" presetClass="entr" presetSubtype="0" fill="hold" nodeType="withEffect">
                                   <p:stCondLst>
                                     <p:cond delay="0"/>
                                   </p:stCondLst>
@@ -27782,7 +27782,7 @@
                                           </p:stCondLst>
                                         </p:cTn>
                                         <p:tgtEl>
-                                          <p:spTgt spid="33"/>
+                                          <p:spTgt spid="30"/>
                                         </p:tgtEl>
                                         <p:attrNameLst>
                                           <p:attrName>style.visibility</p:attrName>
@@ -34205,7 +34205,7 @@
             </a:r>
             <a:r>
               <a:rPr lang="sv-SE" dirty="0" smtClean="0"/>
-              <a:t>övning/demo</a:t>
+              <a:t>demo</a:t>
             </a:r>
           </a:p>
           <a:p>

</xml_diff>

<commit_message>
Updated instructions for code
</commit_message>
<xml_diff>
--- a/doc/Scala intermediate.pptx
+++ b/doc/Scala intermediate.pptx
@@ -173,7 +173,7 @@
   </p:defaultTextStyle>
   <p:extLst>
     <p:ext uri="{EFAFB233-063F-42B5-8137-9DF3F51BA10A}">
-      <p15:sldGuideLst xmlns:p15="http://schemas.microsoft.com/office/powerpoint/2012/main">
+      <p15:sldGuideLst xmlns:p15="http://schemas.microsoft.com/office/powerpoint/2012/main" xmlns="">
         <p15:guide id="1" orient="horz" pos="2160">
           <p15:clr>
             <a:srgbClr val="A4A3A4"/>
@@ -187,7 +187,7 @@
       </p15:sldGuideLst>
     </p:ext>
     <p:ext uri="{2D200454-40CA-4A62-9FC3-DE9A4176ACB9}">
-      <p15:notesGuideLst xmlns:p15="http://schemas.microsoft.com/office/powerpoint/2012/main"/>
+      <p15:notesGuideLst xmlns:p15="http://schemas.microsoft.com/office/powerpoint/2012/main" xmlns=""/>
     </p:ext>
   </p:extLst>
 </p:presentation>
@@ -302,7 +302,7 @@
               <a:pPr>
                 <a:defRPr/>
               </a:pPr>
-              <a:t>5/2/2014</a:t>
+              <a:t>2014-05-05</a:t>
             </a:fld>
             <a:endParaRPr lang="en-US"/>
           </a:p>
@@ -521,7 +521,7 @@
               <a:pPr>
                 <a:defRPr/>
               </a:pPr>
-              <a:t>5/2/2014</a:t>
+              <a:t>2014-05-05</a:t>
             </a:fld>
             <a:endParaRPr lang="en-US"/>
           </a:p>
@@ -3697,7 +3697,7 @@
               <a:pPr>
                 <a:defRPr/>
               </a:pPr>
-              <a:t>5/2/2014</a:t>
+              <a:t>2014-05-05</a:t>
             </a:fld>
             <a:endParaRPr lang="en-US"/>
           </a:p>
@@ -3855,7 +3855,7 @@
               <a:pPr>
                 <a:defRPr/>
               </a:pPr>
-              <a:t>5/2/2014</a:t>
+              <a:t>2014-05-05</a:t>
             </a:fld>
             <a:endParaRPr lang="en-US"/>
           </a:p>
@@ -4169,7 +4169,7 @@
               <a:pPr>
                 <a:defRPr/>
               </a:pPr>
-              <a:t>5/2/2014</a:t>
+              <a:t>2014-05-05</a:t>
             </a:fld>
             <a:endParaRPr lang="en-US"/>
           </a:p>
@@ -4629,7 +4629,7 @@
               <a:pPr>
                 <a:defRPr/>
               </a:pPr>
-              <a:t>5/2/2014</a:t>
+              <a:t>2014-05-05</a:t>
             </a:fld>
             <a:endParaRPr lang="en-US"/>
           </a:p>
@@ -4769,7 +4769,7 @@
               <a:pPr>
                 <a:defRPr/>
               </a:pPr>
-              <a:t>5/2/2014</a:t>
+              <a:t>2014-05-05</a:t>
             </a:fld>
             <a:endParaRPr lang="en-US"/>
           </a:p>
@@ -4961,7 +4961,7 @@
               <a:pPr>
                 <a:defRPr/>
               </a:pPr>
-              <a:t>5/2/2014</a:t>
+              <a:t>2014-05-05</a:t>
             </a:fld>
             <a:endParaRPr lang="en-US"/>
           </a:p>
@@ -5275,7 +5275,7 @@
               <a:pPr>
                 <a:defRPr/>
               </a:pPr>
-              <a:t>5/2/2014</a:t>
+              <a:t>2014-05-05</a:t>
             </a:fld>
             <a:endParaRPr lang="en-US"/>
           </a:p>
@@ -5735,7 +5735,7 @@
               <a:pPr>
                 <a:defRPr/>
               </a:pPr>
-              <a:t>5/2/2014</a:t>
+              <a:t>2014-05-05</a:t>
             </a:fld>
             <a:endParaRPr lang="en-US"/>
           </a:p>
@@ -5875,7 +5875,7 @@
               <a:pPr>
                 <a:defRPr/>
               </a:pPr>
-              <a:t>5/2/2014</a:t>
+              <a:t>2014-05-05</a:t>
             </a:fld>
             <a:endParaRPr lang="en-US"/>
           </a:p>
@@ -6067,7 +6067,7 @@
               <a:pPr>
                 <a:defRPr/>
               </a:pPr>
-              <a:t>5/2/2014</a:t>
+              <a:t>2014-05-05</a:t>
             </a:fld>
             <a:endParaRPr lang="en-US"/>
           </a:p>
@@ -6373,7 +6373,7 @@
               <a:pPr>
                 <a:defRPr/>
               </a:pPr>
-              <a:t>5/2/2014</a:t>
+              <a:t>2014-05-05</a:t>
             </a:fld>
             <a:endParaRPr lang="en-US"/>
           </a:p>
@@ -6628,7 +6628,7 @@
               <a:pPr>
                 <a:defRPr/>
               </a:pPr>
-              <a:t>5/2/2014</a:t>
+              <a:t>2014-05-05</a:t>
             </a:fld>
             <a:endParaRPr lang="en-US"/>
           </a:p>
@@ -7088,7 +7088,7 @@
               <a:pPr>
                 <a:defRPr/>
               </a:pPr>
-              <a:t>5/2/2014</a:t>
+              <a:t>2014-05-05</a:t>
             </a:fld>
             <a:endParaRPr lang="en-US"/>
           </a:p>
@@ -7228,7 +7228,7 @@
               <a:pPr>
                 <a:defRPr/>
               </a:pPr>
-              <a:t>5/2/2014</a:t>
+              <a:t>2014-05-05</a:t>
             </a:fld>
             <a:endParaRPr lang="en-US"/>
           </a:p>
@@ -7420,7 +7420,7 @@
               <a:pPr>
                 <a:defRPr/>
               </a:pPr>
-              <a:t>5/2/2014</a:t>
+              <a:t>2014-05-05</a:t>
             </a:fld>
             <a:endParaRPr lang="en-US"/>
           </a:p>
@@ -7734,7 +7734,7 @@
               <a:pPr>
                 <a:defRPr/>
               </a:pPr>
-              <a:t>5/2/2014</a:t>
+              <a:t>2014-05-05</a:t>
             </a:fld>
             <a:endParaRPr lang="en-US"/>
           </a:p>
@@ -8194,7 +8194,7 @@
               <a:pPr>
                 <a:defRPr/>
               </a:pPr>
-              <a:t>5/2/2014</a:t>
+              <a:t>2014-05-05</a:t>
             </a:fld>
             <a:endParaRPr lang="en-US"/>
           </a:p>
@@ -8334,7 +8334,7 @@
               <a:pPr>
                 <a:defRPr/>
               </a:pPr>
-              <a:t>5/2/2014</a:t>
+              <a:t>2014-05-05</a:t>
             </a:fld>
             <a:endParaRPr lang="en-US"/>
           </a:p>
@@ -8526,7 +8526,7 @@
               <a:pPr>
                 <a:defRPr/>
               </a:pPr>
-              <a:t>5/2/2014</a:t>
+              <a:t>2014-05-05</a:t>
             </a:fld>
             <a:endParaRPr lang="en-US"/>
           </a:p>
@@ -8840,7 +8840,7 @@
               <a:pPr>
                 <a:defRPr/>
               </a:pPr>
-              <a:t>5/2/2014</a:t>
+              <a:t>2014-05-05</a:t>
             </a:fld>
             <a:endParaRPr lang="en-US"/>
           </a:p>
@@ -9300,7 +9300,7 @@
               <a:pPr>
                 <a:defRPr/>
               </a:pPr>
-              <a:t>5/2/2014</a:t>
+              <a:t>2014-05-05</a:t>
             </a:fld>
             <a:endParaRPr lang="en-US"/>
           </a:p>
@@ -9654,7 +9654,7 @@
               <a:pPr>
                 <a:defRPr/>
               </a:pPr>
-              <a:t>5/2/2014</a:t>
+              <a:t>2014-05-05</a:t>
             </a:fld>
             <a:endParaRPr lang="en-US"/>
           </a:p>
@@ -11322,7 +11322,7 @@
               <a:pPr>
                 <a:defRPr/>
               </a:pPr>
-              <a:t>5/2/2014</a:t>
+              <a:t>2014-05-05</a:t>
             </a:fld>
             <a:endParaRPr lang="en-US"/>
           </a:p>
@@ -11445,7 +11445,7 @@
   <p:timing>
     <p:tnLst>
       <p:par>
-        <p:cTn id="1" dur="indefinite" restart="never" nodeType="tmRoot"/>
+        <p:cTn xmlns:p14="http://schemas.microsoft.com/office/powerpoint/2010/main" id="1" dur="indefinite" restart="never" nodeType="tmRoot"/>
       </p:par>
     </p:tnLst>
   </p:timing>
@@ -12062,7 +12062,7 @@
               <a:pPr>
                 <a:defRPr/>
               </a:pPr>
-              <a:t>5/2/2014</a:t>
+              <a:t>2014-05-05</a:t>
             </a:fld>
             <a:endParaRPr lang="en-US"/>
           </a:p>
@@ -12179,7 +12179,7 @@
   <p:timing>
     <p:tnLst>
       <p:par>
-        <p:cTn id="1" dur="indefinite" restart="never" nodeType="tmRoot"/>
+        <p:cTn xmlns:p14="http://schemas.microsoft.com/office/powerpoint/2010/main" id="1" dur="indefinite" restart="never" nodeType="tmRoot"/>
       </p:par>
     </p:tnLst>
   </p:timing>
@@ -12764,7 +12764,7 @@
               <a:pPr>
                 <a:defRPr/>
               </a:pPr>
-              <a:t>5/2/2014</a:t>
+              <a:t>2014-05-05</a:t>
             </a:fld>
             <a:endParaRPr lang="en-US"/>
           </a:p>
@@ -12885,7 +12885,7 @@
   <p:timing>
     <p:tnLst>
       <p:par>
-        <p:cTn id="1" dur="indefinite" restart="never" nodeType="tmRoot"/>
+        <p:cTn xmlns:p14="http://schemas.microsoft.com/office/powerpoint/2010/main" id="1" dur="indefinite" restart="never" nodeType="tmRoot"/>
       </p:par>
     </p:tnLst>
   </p:timing>
@@ -13534,7 +13534,7 @@
               <a:pPr>
                 <a:defRPr/>
               </a:pPr>
-              <a:t>5/2/2014</a:t>
+              <a:t>2014-05-05</a:t>
             </a:fld>
             <a:endParaRPr lang="en-US"/>
           </a:p>
@@ -13653,7 +13653,7 @@
   <p:timing>
     <p:tnLst>
       <p:par>
-        <p:cTn id="1" dur="indefinite" restart="never" nodeType="tmRoot"/>
+        <p:cTn xmlns:p14="http://schemas.microsoft.com/office/powerpoint/2010/main" id="1" dur="indefinite" restart="never" nodeType="tmRoot"/>
       </p:par>
     </p:tnLst>
   </p:timing>
@@ -14302,7 +14302,7 @@
               <a:pPr>
                 <a:defRPr/>
               </a:pPr>
-              <a:t>5/2/2014</a:t>
+              <a:t>2014-05-05</a:t>
             </a:fld>
             <a:endParaRPr lang="en-US"/>
           </a:p>
@@ -14421,7 +14421,7 @@
   <p:timing>
     <p:tnLst>
       <p:par>
-        <p:cTn id="1" dur="indefinite" restart="never" nodeType="tmRoot"/>
+        <p:cTn xmlns:p14="http://schemas.microsoft.com/office/powerpoint/2010/main" id="1" dur="indefinite" restart="never" nodeType="tmRoot"/>
       </p:par>
     </p:tnLst>
   </p:timing>
@@ -15070,7 +15070,7 @@
               <a:pPr>
                 <a:defRPr/>
               </a:pPr>
-              <a:t>5/2/2014</a:t>
+              <a:t>2014-05-05</a:t>
             </a:fld>
             <a:endParaRPr lang="en-US"/>
           </a:p>
@@ -15189,7 +15189,7 @@
   <p:timing>
     <p:tnLst>
       <p:par>
-        <p:cTn id="1" dur="indefinite" restart="never" nodeType="tmRoot"/>
+        <p:cTn xmlns:p14="http://schemas.microsoft.com/office/powerpoint/2010/main" id="1" dur="indefinite" restart="never" nodeType="tmRoot"/>
       </p:par>
     </p:tnLst>
   </p:timing>
@@ -15838,7 +15838,7 @@
               <a:pPr>
                 <a:defRPr/>
               </a:pPr>
-              <a:t>5/2/2014</a:t>
+              <a:t>2014-05-05</a:t>
             </a:fld>
             <a:endParaRPr lang="en-US"/>
           </a:p>
@@ -15957,7 +15957,7 @@
   <p:timing>
     <p:tnLst>
       <p:par>
-        <p:cTn id="1" dur="indefinite" restart="never" nodeType="tmRoot"/>
+        <p:cTn xmlns:p14="http://schemas.microsoft.com/office/powerpoint/2010/main" id="1" dur="indefinite" restart="never" nodeType="tmRoot"/>
       </p:par>
     </p:tnLst>
   </p:timing>
@@ -16606,7 +16606,7 @@
               <a:pPr>
                 <a:defRPr/>
               </a:pPr>
-              <a:t>5/2/2014</a:t>
+              <a:t>2014-05-05</a:t>
             </a:fld>
             <a:endParaRPr lang="en-US"/>
           </a:p>
@@ -16757,7 +16757,7 @@
   <p:timing>
     <p:tnLst>
       <p:par>
-        <p:cTn id="1" dur="indefinite" restart="never" nodeType="tmRoot"/>
+        <p:cTn xmlns:p14="http://schemas.microsoft.com/office/powerpoint/2010/main" id="1" dur="indefinite" restart="never" nodeType="tmRoot"/>
       </p:par>
     </p:tnLst>
   </p:timing>
@@ -17374,7 +17374,7 @@
               <a:pPr>
                 <a:defRPr/>
               </a:pPr>
-              <a:t>5/2/2014</a:t>
+              <a:t>2014-05-05</a:t>
             </a:fld>
             <a:endParaRPr lang="en-US"/>
           </a:p>
@@ -17493,7 +17493,7 @@
   <p:timing>
     <p:tnLst>
       <p:par>
-        <p:cTn id="1" dur="indefinite" restart="never" nodeType="tmRoot"/>
+        <p:cTn xmlns:p14="http://schemas.microsoft.com/office/powerpoint/2010/main" id="1" dur="indefinite" restart="never" nodeType="tmRoot"/>
       </p:par>
     </p:tnLst>
   </p:timing>
@@ -18110,7 +18110,7 @@
               <a:pPr>
                 <a:defRPr/>
               </a:pPr>
-              <a:t>5/2/2014</a:t>
+              <a:t>2014-05-05</a:t>
             </a:fld>
             <a:endParaRPr lang="en-US"/>
           </a:p>
@@ -18227,7 +18227,7 @@
   <p:timing>
     <p:tnLst>
       <p:par>
-        <p:cTn id="1" dur="indefinite" restart="never" nodeType="tmRoot"/>
+        <p:cTn xmlns:p14="http://schemas.microsoft.com/office/powerpoint/2010/main" id="1" dur="indefinite" restart="never" nodeType="tmRoot"/>
       </p:par>
     </p:tnLst>
   </p:timing>
@@ -19081,7 +19081,7 @@
   <p:timing>
     <p:tnLst>
       <p:par>
-        <p:cTn id="1" dur="indefinite" restart="never" nodeType="tmRoot"/>
+        <p:cTn xmlns:p14="http://schemas.microsoft.com/office/powerpoint/2010/main" id="1" dur="indefinite" restart="never" nodeType="tmRoot"/>
       </p:par>
     </p:tnLst>
   </p:timing>
@@ -19123,11 +19123,7 @@
             <a:pPr eaLnBrk="1" hangingPunct="1"/>
             <a:r>
               <a:rPr lang="sv-SE" dirty="0" smtClean="0"/>
-              <a:t>Scala – </a:t>
-            </a:r>
-            <a:r>
-              <a:rPr lang="sv-SE" dirty="0" smtClean="0"/>
-              <a:t>Övning 1 - </a:t>
+              <a:t>Scala – Övning 1 - </a:t>
             </a:r>
             <a:r>
               <a:rPr lang="sv-SE" dirty="0" err="1" smtClean="0"/>
@@ -20300,7 +20296,7 @@
   <p:timing>
     <p:tnLst>
       <p:par>
-        <p:cTn id="1" dur="indefinite" restart="never" nodeType="tmRoot"/>
+        <p:cTn xmlns:p14="http://schemas.microsoft.com/office/powerpoint/2010/main" id="1" dur="indefinite" restart="never" nodeType="tmRoot"/>
       </p:par>
     </p:tnLst>
   </p:timing>
@@ -21697,7 +21693,7 @@
   <p:timing>
     <p:tnLst>
       <p:par>
-        <p:cTn id="1" dur="indefinite" restart="never" nodeType="tmRoot"/>
+        <p:cTn xmlns:p14="http://schemas.microsoft.com/office/powerpoint/2010/main" id="1" dur="indefinite" restart="never" nodeType="tmRoot"/>
       </p:par>
     </p:tnLst>
   </p:timing>
@@ -23468,7 +23464,7 @@
   <p:timing>
     <p:tnLst>
       <p:par>
-        <p:cTn id="1" dur="indefinite" restart="never" nodeType="tmRoot"/>
+        <p:cTn xmlns:p14="http://schemas.microsoft.com/office/powerpoint/2010/main" id="1" dur="indefinite" restart="never" nodeType="tmRoot"/>
       </p:par>
     </p:tnLst>
   </p:timing>
@@ -25263,7 +25259,7 @@
   <p:timing>
     <p:tnLst>
       <p:par>
-        <p:cTn id="1" dur="indefinite" restart="never" nodeType="tmRoot"/>
+        <p:cTn xmlns:p14="http://schemas.microsoft.com/office/powerpoint/2010/main" id="1" dur="indefinite" restart="never" nodeType="tmRoot"/>
       </p:par>
     </p:tnLst>
   </p:timing>
@@ -25315,7 +25311,6 @@
               <a:rPr lang="sv-SE" dirty="0" smtClean="0"/>
               <a:t> supervision</a:t>
             </a:r>
-            <a:endParaRPr lang="sv-SE" dirty="0" smtClean="0"/>
           </a:p>
         </p:txBody>
       </p:sp>
@@ -26103,7 +26098,7 @@
   <p:timing>
     <p:tnLst>
       <p:par>
-        <p:cTn id="1" dur="indefinite" restart="never" nodeType="tmRoot"/>
+        <p:cTn xmlns:p14="http://schemas.microsoft.com/office/powerpoint/2010/main" id="1" dur="indefinite" restart="never" nodeType="tmRoot"/>
       </p:par>
     </p:tnLst>
   </p:timing>
@@ -26155,7 +26150,6 @@
               <a:rPr lang="sv-SE" dirty="0" smtClean="0"/>
               <a:t> supervision</a:t>
             </a:r>
-            <a:endParaRPr lang="sv-SE" dirty="0" smtClean="0"/>
           </a:p>
         </p:txBody>
       </p:sp>
@@ -27215,7 +27209,7 @@
   <p:timing>
     <p:tnLst>
       <p:par>
-        <p:cTn id="1" dur="indefinite" restart="never" nodeType="tmRoot">
+        <p:cTn xmlns:p14="http://schemas.microsoft.com/office/powerpoint/2010/main" id="1" dur="indefinite" restart="never" nodeType="tmRoot">
           <p:childTnLst>
             <p:seq concurrent="1" nextAc="seek">
               <p:cTn id="2" dur="indefinite" nodeType="mainSeq">
@@ -28746,7 +28740,7 @@
   <p:timing>
     <p:tnLst>
       <p:par>
-        <p:cTn id="1" dur="indefinite" restart="never" nodeType="tmRoot">
+        <p:cTn xmlns:p14="http://schemas.microsoft.com/office/powerpoint/2010/main" id="1" dur="indefinite" restart="never" nodeType="tmRoot">
           <p:childTnLst>
             <p:seq concurrent="1" nextAc="seek">
               <p:cTn id="2" dur="indefinite" nodeType="mainSeq">
@@ -30695,7 +30689,7 @@
   <p:timing>
     <p:tnLst>
       <p:par>
-        <p:cTn id="1" dur="indefinite" restart="never" nodeType="tmRoot"/>
+        <p:cTn xmlns:p14="http://schemas.microsoft.com/office/powerpoint/2010/main" id="1" dur="indefinite" restart="never" nodeType="tmRoot"/>
       </p:par>
     </p:tnLst>
   </p:timing>
@@ -32303,7 +32297,7 @@
   <p:timing>
     <p:tnLst>
       <p:par>
-        <p:cTn id="1" dur="indefinite" restart="never" nodeType="tmRoot"/>
+        <p:cTn xmlns:p14="http://schemas.microsoft.com/office/powerpoint/2010/main" id="1" dur="indefinite" restart="never" nodeType="tmRoot"/>
       </p:par>
     </p:tnLst>
   </p:timing>
@@ -32345,13 +32339,8 @@
             <a:pPr eaLnBrk="1" hangingPunct="1"/>
             <a:r>
               <a:rPr lang="sv-SE" dirty="0" smtClean="0"/>
-              <a:t>Scala – </a:t>
-            </a:r>
-            <a:r>
-              <a:rPr lang="sv-SE" dirty="0" smtClean="0"/>
-              <a:t>Mer om Akka</a:t>
-            </a:r>
-            <a:endParaRPr lang="sv-SE" dirty="0" smtClean="0"/>
+              <a:t>Scala – Mer om Akka</a:t>
+            </a:r>
           </a:p>
         </p:txBody>
       </p:sp>
@@ -32592,7 +32581,7 @@
   <p:timing>
     <p:tnLst>
       <p:par>
-        <p:cTn id="1" dur="indefinite" restart="never" nodeType="tmRoot"/>
+        <p:cTn xmlns:p14="http://schemas.microsoft.com/office/powerpoint/2010/main" id="1" dur="indefinite" restart="never" nodeType="tmRoot"/>
       </p:par>
     </p:tnLst>
   </p:timing>
@@ -32715,19 +32704,7 @@
             <a:pPr eaLnBrk="1" hangingPunct="1"/>
             <a:r>
               <a:rPr lang="sv-SE" dirty="0" smtClean="0"/>
-              <a:t>allt </a:t>
-            </a:r>
-            <a:r>
-              <a:rPr lang="sv-SE" dirty="0" smtClean="0"/>
-              <a:t>är </a:t>
-            </a:r>
-            <a:r>
-              <a:rPr lang="sv-SE" dirty="0" smtClean="0"/>
-              <a:t>objekt</a:t>
-            </a:r>
-            <a:r>
-              <a:rPr lang="sv-SE" dirty="0" smtClean="0"/>
-              <a:t>, inklusive funktioner och </a:t>
+              <a:t>allt är objekt, inklusive funktioner och </a:t>
             </a:r>
             <a:r>
               <a:rPr lang="sv-SE" dirty="0" err="1" smtClean="0"/>
@@ -32754,11 +32731,7 @@
             </a:r>
             <a:r>
               <a:rPr lang="sv-SE" dirty="0" smtClean="0"/>
-              <a:t> </a:t>
-            </a:r>
-            <a:r>
-              <a:rPr lang="sv-SE" dirty="0" smtClean="0"/>
-              <a:t>och </a:t>
+              <a:t> och </a:t>
             </a:r>
             <a:r>
               <a:rPr lang="sv-SE" dirty="0" err="1" smtClean="0"/>
@@ -32790,11 +32763,7 @@
             </a:r>
             <a:r>
               <a:rPr lang="sv-SE" dirty="0" smtClean="0"/>
-              <a:t> </a:t>
-            </a:r>
-            <a:r>
-              <a:rPr lang="sv-SE" dirty="0" smtClean="0"/>
-              <a:t>(invariant, </a:t>
+              <a:t> (invariant, </a:t>
             </a:r>
             <a:r>
               <a:rPr lang="sv-SE" dirty="0" err="1" smtClean="0"/>
@@ -32844,15 +32813,7 @@
             <a:pPr eaLnBrk="1" hangingPunct="1"/>
             <a:r>
               <a:rPr lang="sv-SE" dirty="0" smtClean="0"/>
-              <a:t>högre </a:t>
-            </a:r>
-            <a:r>
-              <a:rPr lang="sv-SE" dirty="0" smtClean="0"/>
-              <a:t>ordningens </a:t>
-            </a:r>
-            <a:r>
-              <a:rPr lang="sv-SE" dirty="0" smtClean="0"/>
-              <a:t>funktioner</a:t>
+              <a:t>högre ordningens funktioner</a:t>
             </a:r>
           </a:p>
           <a:p>
@@ -33001,13 +32962,8 @@
             </a:r>
             <a:r>
               <a:rPr lang="sv-SE" dirty="0" smtClean="0"/>
-              <a:t> </a:t>
-            </a:r>
-            <a:r>
-              <a:rPr lang="sv-SE" dirty="0" smtClean="0"/>
-              <a:t>programmering</a:t>
-            </a:r>
-            <a:endParaRPr lang="sv-SE" dirty="0" smtClean="0"/>
+              <a:t> programmering</a:t>
+            </a:r>
           </a:p>
           <a:p>
             <a:pPr eaLnBrk="1" hangingPunct="1"/>
@@ -33057,7 +33013,7 @@
   <p:timing>
     <p:tnLst>
       <p:par>
-        <p:cTn id="1" dur="indefinite" restart="never" nodeType="tmRoot"/>
+        <p:cTn xmlns:p14="http://schemas.microsoft.com/office/powerpoint/2010/main" id="1" dur="indefinite" restart="never" nodeType="tmRoot"/>
       </p:par>
     </p:tnLst>
   </p:timing>
@@ -33099,13 +33055,8 @@
             <a:pPr eaLnBrk="1" hangingPunct="1"/>
             <a:r>
               <a:rPr lang="sv-SE" dirty="0" smtClean="0"/>
-              <a:t>Scala – </a:t>
-            </a:r>
-            <a:r>
-              <a:rPr lang="sv-SE" dirty="0" smtClean="0"/>
-              <a:t>Övning 1, beräkna PI</a:t>
-            </a:r>
-            <a:endParaRPr lang="sv-SE" dirty="0" smtClean="0"/>
+              <a:t>Scala – Övning 1, beräkna PI</a:t>
+            </a:r>
           </a:p>
         </p:txBody>
       </p:sp>
@@ -33163,13 +33114,8 @@
             <a:pPr eaLnBrk="1" hangingPunct="1"/>
             <a:r>
               <a:rPr lang="sv-SE" sz="1600" dirty="0" smtClean="0"/>
-              <a:t>Vi ska försöka approximer</a:t>
-            </a:r>
-            <a:r>
-              <a:rPr lang="sv-SE" sz="1600" dirty="0" smtClean="0"/>
-              <a:t>a pi</a:t>
-            </a:r>
-            <a:endParaRPr lang="sv-SE" sz="1600" dirty="0" smtClean="0"/>
+              <a:t>Vi ska försöka approximera pi</a:t>
+            </a:r>
           </a:p>
           <a:p>
             <a:pPr eaLnBrk="1" hangingPunct="1"/>
@@ -33350,7 +33296,7 @@
   <p:timing>
     <p:tnLst>
       <p:par>
-        <p:cTn id="1" dur="indefinite" restart="never" nodeType="tmRoot"/>
+        <p:cTn xmlns:p14="http://schemas.microsoft.com/office/powerpoint/2010/main" id="1" dur="indefinite" restart="never" nodeType="tmRoot"/>
       </p:par>
     </p:tnLst>
   </p:timing>
@@ -33392,13 +33338,8 @@
             <a:pPr eaLnBrk="1" hangingPunct="1"/>
             <a:r>
               <a:rPr lang="sv-SE" dirty="0" smtClean="0"/>
-              <a:t>Scala – </a:t>
-            </a:r>
-            <a:r>
-              <a:rPr lang="sv-SE" dirty="0" smtClean="0"/>
-              <a:t>Övning 1, en möjlig implementation</a:t>
-            </a:r>
-            <a:endParaRPr lang="sv-SE" dirty="0" smtClean="0"/>
+              <a:t>Scala – Övning 1, en möjlig implementation</a:t>
+            </a:r>
           </a:p>
         </p:txBody>
       </p:sp>
@@ -33695,7 +33636,6 @@
               <a:rPr lang="sv-SE" dirty="0" smtClean="0"/>
               <a:t>kan vara:</a:t>
             </a:r>
-            <a:endParaRPr lang="sv-SE" dirty="0" smtClean="0"/>
           </a:p>
         </p:txBody>
       </p:sp>
@@ -34268,7 +34208,7 @@
   <p:timing>
     <p:tnLst>
       <p:par>
-        <p:cTn id="1" dur="indefinite" restart="never" nodeType="tmRoot"/>
+        <p:cTn xmlns:p14="http://schemas.microsoft.com/office/powerpoint/2010/main" id="1" dur="indefinite" restart="never" nodeType="tmRoot"/>
       </p:par>
     </p:tnLst>
   </p:timing>
@@ -36035,7 +35975,7 @@
   <p:timing>
     <p:tnLst>
       <p:par>
-        <p:cTn id="1" dur="indefinite" restart="never" nodeType="tmRoot"/>
+        <p:cTn xmlns:p14="http://schemas.microsoft.com/office/powerpoint/2010/main" id="1" dur="indefinite" restart="never" nodeType="tmRoot"/>
       </p:par>
     </p:tnLst>
   </p:timing>
@@ -37452,7 +37392,7 @@
   <p:timing>
     <p:tnLst>
       <p:par>
-        <p:cTn id="1" dur="indefinite" restart="never" nodeType="tmRoot"/>
+        <p:cTn xmlns:p14="http://schemas.microsoft.com/office/powerpoint/2010/main" id="1" dur="indefinite" restart="never" nodeType="tmRoot"/>
       </p:par>
     </p:tnLst>
   </p:timing>
@@ -37564,7 +37504,6 @@
               <a:rPr lang="sv-SE" dirty="0" smtClean="0"/>
               <a:t>)</a:t>
             </a:r>
-            <a:endParaRPr lang="sv-SE" dirty="0" smtClean="0"/>
           </a:p>
           <a:p>
             <a:pPr eaLnBrk="1" hangingPunct="1"/>
@@ -37620,11 +37559,7 @@
             </a:r>
             <a:r>
               <a:rPr lang="sv-SE" dirty="0" smtClean="0"/>
-              <a:t> </a:t>
-            </a:r>
-            <a:r>
-              <a:rPr lang="sv-SE" dirty="0" smtClean="0"/>
-              <a:t>och combinators</a:t>
+              <a:t> och combinators</a:t>
             </a:r>
           </a:p>
           <a:p>
@@ -37635,11 +37570,7 @@
             </a:r>
             <a:r>
               <a:rPr lang="sv-SE" dirty="0" smtClean="0"/>
-              <a:t> </a:t>
-            </a:r>
-            <a:r>
-              <a:rPr lang="sv-SE" dirty="0" smtClean="0"/>
-              <a:t>och </a:t>
+              <a:t> och </a:t>
             </a:r>
             <a:r>
               <a:rPr lang="sv-SE" dirty="0" err="1" smtClean="0"/>
@@ -37651,11 +37582,7 @@
             <a:pPr eaLnBrk="1" hangingPunct="1"/>
             <a:r>
               <a:rPr lang="sv-SE" dirty="0" smtClean="0"/>
-              <a:t>Scala </a:t>
-            </a:r>
-            <a:r>
-              <a:rPr lang="sv-SE" dirty="0" smtClean="0"/>
-              <a:t>testning, titta på </a:t>
+              <a:t>Scala testning, titta på </a:t>
             </a:r>
             <a:r>
               <a:rPr lang="sv-SE" dirty="0" err="1" smtClean="0"/>
@@ -37674,11 +37601,7 @@
             <a:pPr eaLnBrk="1" hangingPunct="1"/>
             <a:r>
               <a:rPr lang="sv-SE" dirty="0" smtClean="0"/>
-              <a:t>Style </a:t>
-            </a:r>
-            <a:r>
-              <a:rPr lang="sv-SE" dirty="0" smtClean="0"/>
-              <a:t>och praktiskt Scala</a:t>
+              <a:t>Style och praktiskt Scala</a:t>
             </a:r>
           </a:p>
           <a:p>
@@ -37691,7 +37614,6 @@
               <a:rPr lang="sv-SE" dirty="0" smtClean="0"/>
               <a:t>Annat om tid finns</a:t>
             </a:r>
-            <a:endParaRPr lang="sv-SE" dirty="0" smtClean="0"/>
           </a:p>
         </p:txBody>
       </p:sp>
@@ -37737,7 +37659,7 @@
   <p:timing>
     <p:tnLst>
       <p:par>
-        <p:cTn id="1" dur="indefinite" restart="never" nodeType="tmRoot"/>
+        <p:cTn xmlns:p14="http://schemas.microsoft.com/office/powerpoint/2010/main" id="1" dur="indefinite" restart="never" nodeType="tmRoot"/>
       </p:par>
     </p:tnLst>
   </p:timing>
@@ -37797,7 +37719,7 @@
         <p:spPr>
           <a:xfrm>
             <a:off x="395288" y="1341438"/>
-            <a:ext cx="8605837" cy="3995774"/>
+            <a:ext cx="8605837" cy="4679850"/>
           </a:xfrm>
         </p:spPr>
         <p:txBody>
@@ -37865,6 +37787,14 @@
             <a:pPr eaLnBrk="1" hangingPunct="1"/>
             <a:r>
               <a:rPr lang="sv-SE" dirty="0" smtClean="0"/>
+              <a:t>Kopiera C:\Scala\Setup\.Idea13C</a:t>
+            </a:r>
+            <a:endParaRPr lang="sv-SE" dirty="0" smtClean="0"/>
+          </a:p>
+          <a:p>
+            <a:pPr eaLnBrk="1" hangingPunct="1"/>
+            <a:r>
+              <a:rPr lang="sv-SE" dirty="0" smtClean="0"/>
               <a:t>Starta </a:t>
             </a:r>
             <a:r>
@@ -37881,11 +37811,7 @@
             </a:r>
             <a:r>
               <a:rPr lang="sv-SE" dirty="0" smtClean="0"/>
-              <a:t> </a:t>
-            </a:r>
-            <a:r>
-              <a:rPr lang="sv-SE" dirty="0" smtClean="0"/>
-              <a:t>new Scala </a:t>
+              <a:t> new Scala </a:t>
             </a:r>
             <a:r>
               <a:rPr lang="sv-SE" dirty="0" err="1" smtClean="0"/>
@@ -37906,7 +37832,6 @@
               <a:rPr lang="sv-SE" dirty="0" smtClean="0"/>
               <a:t>Java 1.8</a:t>
             </a:r>
-            <a:endParaRPr lang="sv-SE" dirty="0" smtClean="0"/>
           </a:p>
           <a:p>
             <a:pPr eaLnBrk="1" hangingPunct="1"/>
@@ -37920,19 +37845,7 @@
             </a:r>
             <a:r>
               <a:rPr lang="sv-SE" dirty="0" smtClean="0"/>
-              <a:t>, se till att </a:t>
-            </a:r>
-            <a:r>
-              <a:rPr lang="sv-SE" dirty="0" smtClean="0"/>
-              <a:t>HELA </a:t>
-            </a:r>
-            <a:r>
-              <a:rPr lang="sv-SE" dirty="0" smtClean="0"/>
-              <a:t>sökvägen </a:t>
-            </a:r>
-            <a:r>
-              <a:rPr lang="sv-SE" dirty="0" smtClean="0"/>
-              <a:t>(</a:t>
+              <a:t>, se till att HELA sökvägen (</a:t>
             </a:r>
             <a:r>
               <a:rPr lang="sv-SE" dirty="0" err="1" smtClean="0"/>
@@ -37964,11 +37877,11 @@
             </a:r>
             <a:r>
               <a:rPr lang="sv-SE" dirty="0"/>
-              <a:t>:\</a:t>
-            </a:r>
-            <a:r>
-              <a:rPr lang="sv-SE" dirty="0" smtClean="0"/>
-              <a:t>Projekt\</a:t>
+              <a:t>:</a:t>
+            </a:r>
+            <a:r>
+              <a:rPr lang="sv-SE" smtClean="0"/>
+              <a:t>\Scala\</a:t>
             </a:r>
             <a:r>
               <a:rPr lang="sv-SE" dirty="0" err="1" smtClean="0"/>
@@ -37978,7 +37891,6 @@
               <a:rPr lang="sv-SE" dirty="0" smtClean="0"/>
               <a:t>”</a:t>
             </a:r>
-            <a:endParaRPr lang="sv-SE" dirty="0" smtClean="0"/>
           </a:p>
           <a:p>
             <a:pPr eaLnBrk="1" hangingPunct="1"/>
@@ -38099,7 +38011,7 @@
   <p:timing>
     <p:tnLst>
       <p:par>
-        <p:cTn id="1" dur="indefinite" restart="never" nodeType="tmRoot"/>
+        <p:cTn xmlns:p14="http://schemas.microsoft.com/office/powerpoint/2010/main" id="1" dur="indefinite" restart="never" nodeType="tmRoot"/>
       </p:par>
     </p:tnLst>
   </p:timing>
@@ -39227,7 +39139,7 @@
   <p:timing>
     <p:tnLst>
       <p:par>
-        <p:cTn id="1" dur="indefinite" restart="never" nodeType="tmRoot"/>
+        <p:cTn xmlns:p14="http://schemas.microsoft.com/office/powerpoint/2010/main" id="1" dur="indefinite" restart="never" nodeType="tmRoot"/>
       </p:par>
     </p:tnLst>
   </p:timing>
@@ -39502,13 +39414,8 @@
             </a:r>
             <a:r>
               <a:rPr lang="sv-SE" sz="1600" dirty="0"/>
-              <a:t> –f </a:t>
-            </a:r>
-            <a:r>
-              <a:rPr lang="sv-SE" sz="1600" dirty="0"/>
-              <a:t>step2</a:t>
-            </a:r>
-            <a:endParaRPr lang="sv-SE" sz="1600" dirty="0"/>
+              <a:t> –f step2</a:t>
+            </a:r>
           </a:p>
           <a:p>
             <a:pPr marL="0" indent="0" eaLnBrk="1" hangingPunct="1">
@@ -40158,7 +40065,7 @@
   <p:timing>
     <p:tnLst>
       <p:par>
-        <p:cTn id="1" dur="indefinite" restart="never" nodeType="tmRoot"/>
+        <p:cTn xmlns:p14="http://schemas.microsoft.com/office/powerpoint/2010/main" id="1" dur="indefinite" restart="never" nodeType="tmRoot"/>
       </p:par>
     </p:tnLst>
   </p:timing>
@@ -41967,7 +41874,7 @@
   <p:timing>
     <p:tnLst>
       <p:par>
-        <p:cTn id="1" dur="indefinite" restart="never" nodeType="tmRoot"/>
+        <p:cTn xmlns:p14="http://schemas.microsoft.com/office/powerpoint/2010/main" id="1" dur="indefinite" restart="never" nodeType="tmRoot"/>
       </p:par>
     </p:tnLst>
   </p:timing>
@@ -42861,7 +42768,7 @@
   <p:timing>
     <p:tnLst>
       <p:par>
-        <p:cTn id="1" dur="indefinite" restart="never" nodeType="tmRoot"/>
+        <p:cTn xmlns:p14="http://schemas.microsoft.com/office/powerpoint/2010/main" id="1" dur="indefinite" restart="never" nodeType="tmRoot"/>
       </p:par>
     </p:tnLst>
   </p:timing>
@@ -44260,7 +44167,7 @@
   <p:timing>
     <p:tnLst>
       <p:par>
-        <p:cTn id="1" dur="indefinite" restart="never" nodeType="tmRoot"/>
+        <p:cTn xmlns:p14="http://schemas.microsoft.com/office/powerpoint/2010/main" id="1" dur="indefinite" restart="never" nodeType="tmRoot"/>
       </p:par>
     </p:tnLst>
   </p:timing>

</xml_diff>